<commit_message>
State_estimate_ensemble and data ensemble ready
although need to check whether there needs to be covariance somewhere in the data from the get go.
</commit_message>
<xml_diff>
--- a/pictures.pptx
+++ b/pictures.pptx
@@ -5,8 +5,7 @@
     <p:sldMasterId id="2147483648" r:id="rId1"/>
   </p:sldMasterIdLst>
   <p:sldIdLst>
-    <p:sldId id="256" r:id="rId2"/>
-    <p:sldId id="257" r:id="rId3"/>
+    <p:sldId id="258" r:id="rId2"/>
   </p:sldIdLst>
   <p:sldSz cx="12192000" cy="6858000"/>
   <p:notesSz cx="6858000" cy="9144000"/>
@@ -105,6 +104,11 @@
       </a:defRPr>
     </a:lvl9pPr>
   </p:defaultTextStyle>
+  <p:extLst>
+    <p:ext uri="{EFAFB233-063F-42B5-8137-9DF3F51BA10A}">
+      <p15:sldGuideLst xmlns:p15="http://schemas.microsoft.com/office/powerpoint/2012/main"/>
+    </p:ext>
+  </p:extLst>
 </p:presentation>
 </file>
 
@@ -255,7 +259,7 @@
           <a:p>
             <a:fld id="{C74DBE30-BEEC-4DC4-BC73-56B3D3B91653}" type="datetimeFigureOut">
               <a:rPr lang="en-GB" smtClean="0"/>
-              <a:t>22/03/2023</a:t>
+              <a:t>26/04/2023</a:t>
             </a:fld>
             <a:endParaRPr lang="en-GB"/>
           </a:p>
@@ -453,7 +457,7 @@
           <a:p>
             <a:fld id="{C74DBE30-BEEC-4DC4-BC73-56B3D3B91653}" type="datetimeFigureOut">
               <a:rPr lang="en-GB" smtClean="0"/>
-              <a:t>22/03/2023</a:t>
+              <a:t>26/04/2023</a:t>
             </a:fld>
             <a:endParaRPr lang="en-GB"/>
           </a:p>
@@ -661,7 +665,7 @@
           <a:p>
             <a:fld id="{C74DBE30-BEEC-4DC4-BC73-56B3D3B91653}" type="datetimeFigureOut">
               <a:rPr lang="en-GB" smtClean="0"/>
-              <a:t>22/03/2023</a:t>
+              <a:t>26/04/2023</a:t>
             </a:fld>
             <a:endParaRPr lang="en-GB"/>
           </a:p>
@@ -859,7 +863,7 @@
           <a:p>
             <a:fld id="{C74DBE30-BEEC-4DC4-BC73-56B3D3B91653}" type="datetimeFigureOut">
               <a:rPr lang="en-GB" smtClean="0"/>
-              <a:t>22/03/2023</a:t>
+              <a:t>26/04/2023</a:t>
             </a:fld>
             <a:endParaRPr lang="en-GB"/>
           </a:p>
@@ -1134,7 +1138,7 @@
           <a:p>
             <a:fld id="{C74DBE30-BEEC-4DC4-BC73-56B3D3B91653}" type="datetimeFigureOut">
               <a:rPr lang="en-GB" smtClean="0"/>
-              <a:t>22/03/2023</a:t>
+              <a:t>26/04/2023</a:t>
             </a:fld>
             <a:endParaRPr lang="en-GB"/>
           </a:p>
@@ -1399,7 +1403,7 @@
           <a:p>
             <a:fld id="{C74DBE30-BEEC-4DC4-BC73-56B3D3B91653}" type="datetimeFigureOut">
               <a:rPr lang="en-GB" smtClean="0"/>
-              <a:t>22/03/2023</a:t>
+              <a:t>26/04/2023</a:t>
             </a:fld>
             <a:endParaRPr lang="en-GB"/>
           </a:p>
@@ -1811,7 +1815,7 @@
           <a:p>
             <a:fld id="{C74DBE30-BEEC-4DC4-BC73-56B3D3B91653}" type="datetimeFigureOut">
               <a:rPr lang="en-GB" smtClean="0"/>
-              <a:t>22/03/2023</a:t>
+              <a:t>26/04/2023</a:t>
             </a:fld>
             <a:endParaRPr lang="en-GB"/>
           </a:p>
@@ -1952,7 +1956,7 @@
           <a:p>
             <a:fld id="{C74DBE30-BEEC-4DC4-BC73-56B3D3B91653}" type="datetimeFigureOut">
               <a:rPr lang="en-GB" smtClean="0"/>
-              <a:t>22/03/2023</a:t>
+              <a:t>26/04/2023</a:t>
             </a:fld>
             <a:endParaRPr lang="en-GB"/>
           </a:p>
@@ -2065,7 +2069,7 @@
           <a:p>
             <a:fld id="{C74DBE30-BEEC-4DC4-BC73-56B3D3B91653}" type="datetimeFigureOut">
               <a:rPr lang="en-GB" smtClean="0"/>
-              <a:t>22/03/2023</a:t>
+              <a:t>26/04/2023</a:t>
             </a:fld>
             <a:endParaRPr lang="en-GB"/>
           </a:p>
@@ -2376,7 +2380,7 @@
           <a:p>
             <a:fld id="{C74DBE30-BEEC-4DC4-BC73-56B3D3B91653}" type="datetimeFigureOut">
               <a:rPr lang="en-GB" smtClean="0"/>
-              <a:t>22/03/2023</a:t>
+              <a:t>26/04/2023</a:t>
             </a:fld>
             <a:endParaRPr lang="en-GB"/>
           </a:p>
@@ -2664,7 +2668,7 @@
           <a:p>
             <a:fld id="{C74DBE30-BEEC-4DC4-BC73-56B3D3B91653}" type="datetimeFigureOut">
               <a:rPr lang="en-GB" smtClean="0"/>
-              <a:t>22/03/2023</a:t>
+              <a:t>26/04/2023</a:t>
             </a:fld>
             <a:endParaRPr lang="en-GB"/>
           </a:p>
@@ -2905,7 +2909,7 @@
           <a:p>
             <a:fld id="{C74DBE30-BEEC-4DC4-BC73-56B3D3B91653}" type="datetimeFigureOut">
               <a:rPr lang="en-GB" smtClean="0"/>
-              <a:t>22/03/2023</a:t>
+              <a:t>26/04/2023</a:t>
             </a:fld>
             <a:endParaRPr lang="en-GB"/>
           </a:p>
@@ -3324,88 +3328,666 @@
       </p:grpSpPr>
       <p:sp>
         <p:nvSpPr>
-          <p:cNvPr id="2" name="Title 1">
-            <a:extLst>
-              <a:ext uri="{FF2B5EF4-FFF2-40B4-BE49-F238E27FC236}">
-                <a16:creationId xmlns:a16="http://schemas.microsoft.com/office/drawing/2014/main" id="{EF50F948-4D2F-45D4-8D0B-A53F4E349A3F}"/>
-              </a:ext>
-            </a:extLst>
-          </p:cNvPr>
-          <p:cNvSpPr>
-            <a:spLocks noGrp="1"/>
-          </p:cNvSpPr>
-          <p:nvPr>
-            <p:ph type="ctrTitle"/>
-          </p:nvPr>
-        </p:nvSpPr>
-        <p:spPr/>
-        <p:txBody>
-          <a:bodyPr/>
-          <a:lstStyle/>
-          <a:p>
-            <a:endParaRPr lang="en-GB"/>
-          </a:p>
-        </p:txBody>
-      </p:sp>
-      <p:sp>
-        <p:nvSpPr>
-          <p:cNvPr id="3" name="Subtitle 2">
-            <a:extLst>
-              <a:ext uri="{FF2B5EF4-FFF2-40B4-BE49-F238E27FC236}">
-                <a16:creationId xmlns:a16="http://schemas.microsoft.com/office/drawing/2014/main" id="{D5735207-913A-46D9-B29C-47CD513E196E}"/>
-              </a:ext>
-            </a:extLst>
-          </p:cNvPr>
-          <p:cNvSpPr>
-            <a:spLocks noGrp="1"/>
-          </p:cNvSpPr>
-          <p:nvPr>
-            <p:ph type="subTitle" idx="1"/>
-          </p:nvPr>
-        </p:nvSpPr>
-        <p:spPr/>
-        <p:txBody>
-          <a:bodyPr/>
-          <a:lstStyle/>
-          <a:p>
-            <a:endParaRPr lang="en-GB"/>
+          <p:cNvPr id="4" name="Rectangle: Rounded Corners 3">
+            <a:extLst>
+              <a:ext uri="{FF2B5EF4-FFF2-40B4-BE49-F238E27FC236}">
+                <a16:creationId xmlns:a16="http://schemas.microsoft.com/office/drawing/2014/main" id="{7FB3ACF8-BFC2-4923-98DA-AE15476F3729}"/>
+              </a:ext>
+            </a:extLst>
+          </p:cNvPr>
+          <p:cNvSpPr/>
+          <p:nvPr/>
+        </p:nvSpPr>
+        <p:spPr>
+          <a:xfrm>
+            <a:off x="1046375" y="1960775"/>
+            <a:ext cx="2941163" cy="989815"/>
+          </a:xfrm>
+          <a:prstGeom prst="roundRect">
+            <a:avLst/>
+          </a:prstGeom>
+        </p:spPr>
+        <p:style>
+          <a:lnRef idx="2">
+            <a:schemeClr val="accent1">
+              <a:shade val="50000"/>
+            </a:schemeClr>
+          </a:lnRef>
+          <a:fillRef idx="1">
+            <a:schemeClr val="accent1"/>
+          </a:fillRef>
+          <a:effectRef idx="0">
+            <a:schemeClr val="accent1"/>
+          </a:effectRef>
+          <a:fontRef idx="minor">
+            <a:schemeClr val="lt1"/>
+          </a:fontRef>
+        </p:style>
+        <p:txBody>
+          <a:bodyPr rtlCol="0" anchor="ctr"/>
+          <a:lstStyle/>
+          <a:p>
+            <a:pPr algn="ctr"/>
+            <a:r>
+              <a:rPr lang="en-GB" dirty="0"/>
+              <a:t>Macro-level</a:t>
+            </a:r>
+          </a:p>
+        </p:txBody>
+      </p:sp>
+      <p:sp>
+        <p:nvSpPr>
+          <p:cNvPr id="5" name="Rectangle: Rounded Corners 4">
+            <a:extLst>
+              <a:ext uri="{FF2B5EF4-FFF2-40B4-BE49-F238E27FC236}">
+                <a16:creationId xmlns:a16="http://schemas.microsoft.com/office/drawing/2014/main" id="{7FC4D647-1F57-4289-AD25-3F5FF99FFA94}"/>
+              </a:ext>
+            </a:extLst>
+          </p:cNvPr>
+          <p:cNvSpPr/>
+          <p:nvPr/>
+        </p:nvSpPr>
+        <p:spPr>
+          <a:xfrm>
+            <a:off x="1046375" y="4091232"/>
+            <a:ext cx="2941163" cy="989815"/>
+          </a:xfrm>
+          <a:prstGeom prst="roundRect">
+            <a:avLst/>
+          </a:prstGeom>
+        </p:spPr>
+        <p:style>
+          <a:lnRef idx="2">
+            <a:schemeClr val="accent1">
+              <a:shade val="50000"/>
+            </a:schemeClr>
+          </a:lnRef>
+          <a:fillRef idx="1">
+            <a:schemeClr val="accent1"/>
+          </a:fillRef>
+          <a:effectRef idx="0">
+            <a:schemeClr val="accent1"/>
+          </a:effectRef>
+          <a:fontRef idx="minor">
+            <a:schemeClr val="lt1"/>
+          </a:fontRef>
+        </p:style>
+        <p:txBody>
+          <a:bodyPr rtlCol="0" anchor="ctr"/>
+          <a:lstStyle/>
+          <a:p>
+            <a:pPr algn="ctr"/>
+            <a:r>
+              <a:rPr lang="en-GB" dirty="0"/>
+              <a:t>Micro/Agent-level</a:t>
+            </a:r>
+          </a:p>
+        </p:txBody>
+      </p:sp>
+      <p:cxnSp>
+        <p:nvCxnSpPr>
+          <p:cNvPr id="7" name="Straight Arrow Connector 6">
+            <a:extLst>
+              <a:ext uri="{FF2B5EF4-FFF2-40B4-BE49-F238E27FC236}">
+                <a16:creationId xmlns:a16="http://schemas.microsoft.com/office/drawing/2014/main" id="{A827CA3A-2284-474F-B8D0-FD697456F0B2}"/>
+              </a:ext>
+            </a:extLst>
+          </p:cNvPr>
+          <p:cNvCxnSpPr>
+            <a:cxnSpLocks/>
+          </p:cNvCxnSpPr>
+          <p:nvPr/>
+        </p:nvCxnSpPr>
+        <p:spPr>
+          <a:xfrm flipV="1">
+            <a:off x="2507529" y="2950590"/>
+            <a:ext cx="0" cy="1291472"/>
+          </a:xfrm>
+          <a:prstGeom prst="straightConnector1">
+            <a:avLst/>
+          </a:prstGeom>
+          <a:ln w="57150">
+            <a:tailEnd type="triangle"/>
+          </a:ln>
+        </p:spPr>
+        <p:style>
+          <a:lnRef idx="1">
+            <a:schemeClr val="accent1"/>
+          </a:lnRef>
+          <a:fillRef idx="0">
+            <a:schemeClr val="accent1"/>
+          </a:fillRef>
+          <a:effectRef idx="0">
+            <a:schemeClr val="accent1"/>
+          </a:effectRef>
+          <a:fontRef idx="minor">
+            <a:schemeClr val="tx1"/>
+          </a:fontRef>
+        </p:style>
+      </p:cxnSp>
+      <p:sp>
+        <p:nvSpPr>
+          <p:cNvPr id="9" name="TextBox 8">
+            <a:extLst>
+              <a:ext uri="{FF2B5EF4-FFF2-40B4-BE49-F238E27FC236}">
+                <a16:creationId xmlns:a16="http://schemas.microsoft.com/office/drawing/2014/main" id="{43045560-BA6E-4004-A045-4574E2F026EB}"/>
+              </a:ext>
+            </a:extLst>
+          </p:cNvPr>
+          <p:cNvSpPr txBox="1"/>
+          <p:nvPr/>
+        </p:nvSpPr>
+        <p:spPr>
+          <a:xfrm>
+            <a:off x="10548595" y="1846091"/>
+            <a:ext cx="1847654" cy="1200329"/>
+          </a:xfrm>
+          <a:prstGeom prst="rect">
+            <a:avLst/>
+          </a:prstGeom>
+          <a:noFill/>
+        </p:spPr>
+        <p:txBody>
+          <a:bodyPr wrap="square" rtlCol="0">
+            <a:spAutoFit/>
+          </a:bodyPr>
+          <a:lstStyle/>
+          <a:p>
+            <a:r>
+              <a:rPr lang="en-GB" dirty="0"/>
+              <a:t>Top1%</a:t>
+            </a:r>
+          </a:p>
+          <a:p>
+            <a:r>
+              <a:rPr lang="en-GB" dirty="0"/>
+              <a:t>Top10%</a:t>
+            </a:r>
+          </a:p>
+          <a:p>
+            <a:r>
+              <a:rPr lang="en-GB" dirty="0"/>
+              <a:t>Middle 40%</a:t>
+            </a:r>
+          </a:p>
+          <a:p>
+            <a:r>
+              <a:rPr lang="en-GB" dirty="0"/>
+              <a:t>Bottom 50%</a:t>
+            </a:r>
+          </a:p>
+        </p:txBody>
+      </p:sp>
+      <p:cxnSp>
+        <p:nvCxnSpPr>
+          <p:cNvPr id="10" name="Straight Arrow Connector 9">
+            <a:extLst>
+              <a:ext uri="{FF2B5EF4-FFF2-40B4-BE49-F238E27FC236}">
+                <a16:creationId xmlns:a16="http://schemas.microsoft.com/office/drawing/2014/main" id="{8BFCD422-7D33-4D73-9B68-BEE18D771ACD}"/>
+              </a:ext>
+            </a:extLst>
+          </p:cNvPr>
+          <p:cNvCxnSpPr>
+            <a:cxnSpLocks/>
+          </p:cNvCxnSpPr>
+          <p:nvPr/>
+        </p:nvCxnSpPr>
+        <p:spPr>
+          <a:xfrm>
+            <a:off x="3649744" y="2476109"/>
+            <a:ext cx="3071568" cy="0"/>
+          </a:xfrm>
+          <a:prstGeom prst="straightConnector1">
+            <a:avLst/>
+          </a:prstGeom>
+          <a:ln w="57150">
+            <a:tailEnd type="triangle"/>
+          </a:ln>
+        </p:spPr>
+        <p:style>
+          <a:lnRef idx="1">
+            <a:schemeClr val="accent1"/>
+          </a:lnRef>
+          <a:fillRef idx="0">
+            <a:schemeClr val="accent1"/>
+          </a:fillRef>
+          <a:effectRef idx="0">
+            <a:schemeClr val="accent1"/>
+          </a:effectRef>
+          <a:fontRef idx="minor">
+            <a:schemeClr val="tx1"/>
+          </a:fontRef>
+        </p:style>
+      </p:cxnSp>
+      <p:sp>
+        <p:nvSpPr>
+          <p:cNvPr id="12" name="Rectangle: Rounded Corners 11">
+            <a:extLst>
+              <a:ext uri="{FF2B5EF4-FFF2-40B4-BE49-F238E27FC236}">
+                <a16:creationId xmlns:a16="http://schemas.microsoft.com/office/drawing/2014/main" id="{D774B6F6-06AD-46A4-B33B-BDF5D3BADC08}"/>
+              </a:ext>
+            </a:extLst>
+          </p:cNvPr>
+          <p:cNvSpPr/>
+          <p:nvPr/>
+        </p:nvSpPr>
+        <p:spPr>
+          <a:xfrm>
+            <a:off x="6721312" y="1951349"/>
+            <a:ext cx="2941163" cy="989815"/>
+          </a:xfrm>
+          <a:prstGeom prst="roundRect">
+            <a:avLst/>
+          </a:prstGeom>
+        </p:spPr>
+        <p:style>
+          <a:lnRef idx="2">
+            <a:schemeClr val="accent1">
+              <a:shade val="50000"/>
+            </a:schemeClr>
+          </a:lnRef>
+          <a:fillRef idx="1">
+            <a:schemeClr val="accent1"/>
+          </a:fillRef>
+          <a:effectRef idx="0">
+            <a:schemeClr val="accent1"/>
+          </a:effectRef>
+          <a:fontRef idx="minor">
+            <a:schemeClr val="lt1"/>
+          </a:fontRef>
+        </p:style>
+        <p:txBody>
+          <a:bodyPr rtlCol="0" anchor="ctr"/>
+          <a:lstStyle/>
+          <a:p>
+            <a:pPr algn="ctr"/>
+            <a:r>
+              <a:rPr lang="en-GB" dirty="0"/>
+              <a:t>Macro-level</a:t>
+            </a:r>
+          </a:p>
+        </p:txBody>
+      </p:sp>
+      <p:cxnSp>
+        <p:nvCxnSpPr>
+          <p:cNvPr id="13" name="Straight Arrow Connector 12">
+            <a:extLst>
+              <a:ext uri="{FF2B5EF4-FFF2-40B4-BE49-F238E27FC236}">
+                <a16:creationId xmlns:a16="http://schemas.microsoft.com/office/drawing/2014/main" id="{0F2BD332-1280-4C7E-9DE6-D78783C88EC0}"/>
+              </a:ext>
+            </a:extLst>
+          </p:cNvPr>
+          <p:cNvCxnSpPr>
+            <a:cxnSpLocks/>
+            <a:stCxn id="16" idx="2"/>
+          </p:cNvCxnSpPr>
+          <p:nvPr/>
+        </p:nvCxnSpPr>
+        <p:spPr>
+          <a:xfrm>
+            <a:off x="5305719" y="1255353"/>
+            <a:ext cx="0" cy="1220756"/>
+          </a:xfrm>
+          <a:prstGeom prst="straightConnector1">
+            <a:avLst/>
+          </a:prstGeom>
+          <a:ln w="57150">
+            <a:solidFill>
+              <a:srgbClr val="7030A0"/>
+            </a:solidFill>
+            <a:tailEnd type="triangle"/>
+          </a:ln>
+        </p:spPr>
+        <p:style>
+          <a:lnRef idx="1">
+            <a:schemeClr val="accent1"/>
+          </a:lnRef>
+          <a:fillRef idx="0">
+            <a:schemeClr val="accent1"/>
+          </a:fillRef>
+          <a:effectRef idx="0">
+            <a:schemeClr val="accent1"/>
+          </a:effectRef>
+          <a:fontRef idx="minor">
+            <a:schemeClr val="tx1"/>
+          </a:fontRef>
+        </p:style>
+      </p:cxnSp>
+      <p:sp>
+        <p:nvSpPr>
+          <p:cNvPr id="16" name="Rectangle: Rounded Corners 15">
+            <a:extLst>
+              <a:ext uri="{FF2B5EF4-FFF2-40B4-BE49-F238E27FC236}">
+                <a16:creationId xmlns:a16="http://schemas.microsoft.com/office/drawing/2014/main" id="{DA1D7706-C474-4C80-8C16-09C4DD23A9FF}"/>
+              </a:ext>
+            </a:extLst>
+          </p:cNvPr>
+          <p:cNvSpPr/>
+          <p:nvPr/>
+        </p:nvSpPr>
+        <p:spPr>
+          <a:xfrm>
+            <a:off x="3835137" y="265538"/>
+            <a:ext cx="2941163" cy="989815"/>
+          </a:xfrm>
+          <a:prstGeom prst="roundRect">
+            <a:avLst/>
+          </a:prstGeom>
+          <a:solidFill>
+            <a:srgbClr val="7030A0"/>
+          </a:solidFill>
+          <a:ln>
+            <a:noFill/>
+          </a:ln>
+        </p:spPr>
+        <p:style>
+          <a:lnRef idx="2">
+            <a:schemeClr val="accent1">
+              <a:shade val="50000"/>
+            </a:schemeClr>
+          </a:lnRef>
+          <a:fillRef idx="1">
+            <a:schemeClr val="accent1"/>
+          </a:fillRef>
+          <a:effectRef idx="0">
+            <a:schemeClr val="accent1"/>
+          </a:effectRef>
+          <a:fontRef idx="minor">
+            <a:schemeClr val="lt1"/>
+          </a:fontRef>
+        </p:style>
+        <p:txBody>
+          <a:bodyPr rtlCol="0" anchor="ctr"/>
+          <a:lstStyle/>
+          <a:p>
+            <a:pPr algn="ctr"/>
+            <a:r>
+              <a:rPr lang="en-GB" dirty="0" err="1"/>
+              <a:t>EnKF</a:t>
+            </a:r>
+            <a:r>
+              <a:rPr lang="en-GB" dirty="0"/>
+              <a:t> algorithm</a:t>
+            </a:r>
+          </a:p>
+        </p:txBody>
+      </p:sp>
+      <p:cxnSp>
+        <p:nvCxnSpPr>
+          <p:cNvPr id="18" name="Straight Arrow Connector 17">
+            <a:extLst>
+              <a:ext uri="{FF2B5EF4-FFF2-40B4-BE49-F238E27FC236}">
+                <a16:creationId xmlns:a16="http://schemas.microsoft.com/office/drawing/2014/main" id="{AA671E70-97FF-46D0-841F-DAFE30CBD648}"/>
+              </a:ext>
+            </a:extLst>
+          </p:cNvPr>
+          <p:cNvCxnSpPr>
+            <a:cxnSpLocks/>
+          </p:cNvCxnSpPr>
+          <p:nvPr/>
+        </p:nvCxnSpPr>
+        <p:spPr>
+          <a:xfrm>
+            <a:off x="8268878" y="2721206"/>
+            <a:ext cx="0" cy="1370026"/>
+          </a:xfrm>
+          <a:prstGeom prst="straightConnector1">
+            <a:avLst/>
+          </a:prstGeom>
+          <a:ln w="57150">
+            <a:tailEnd type="triangle"/>
+          </a:ln>
+        </p:spPr>
+        <p:style>
+          <a:lnRef idx="1">
+            <a:schemeClr val="accent1"/>
+          </a:lnRef>
+          <a:fillRef idx="0">
+            <a:schemeClr val="accent1"/>
+          </a:fillRef>
+          <a:effectRef idx="0">
+            <a:schemeClr val="accent1"/>
+          </a:effectRef>
+          <a:fontRef idx="minor">
+            <a:schemeClr val="tx1"/>
+          </a:fontRef>
+        </p:style>
+      </p:cxnSp>
+      <p:sp>
+        <p:nvSpPr>
+          <p:cNvPr id="22" name="Rectangle: Rounded Corners 21">
+            <a:extLst>
+              <a:ext uri="{FF2B5EF4-FFF2-40B4-BE49-F238E27FC236}">
+                <a16:creationId xmlns:a16="http://schemas.microsoft.com/office/drawing/2014/main" id="{97418C3F-B0E0-402B-81CA-052907A96225}"/>
+              </a:ext>
+            </a:extLst>
+          </p:cNvPr>
+          <p:cNvSpPr/>
+          <p:nvPr/>
+        </p:nvSpPr>
+        <p:spPr>
+          <a:xfrm>
+            <a:off x="6798296" y="4127366"/>
+            <a:ext cx="2941163" cy="989815"/>
+          </a:xfrm>
+          <a:prstGeom prst="roundRect">
+            <a:avLst/>
+          </a:prstGeom>
+        </p:spPr>
+        <p:style>
+          <a:lnRef idx="2">
+            <a:schemeClr val="accent1">
+              <a:shade val="50000"/>
+            </a:schemeClr>
+          </a:lnRef>
+          <a:fillRef idx="1">
+            <a:schemeClr val="accent1"/>
+          </a:fillRef>
+          <a:effectRef idx="0">
+            <a:schemeClr val="accent1"/>
+          </a:effectRef>
+          <a:fontRef idx="minor">
+            <a:schemeClr val="lt1"/>
+          </a:fontRef>
+        </p:style>
+        <p:txBody>
+          <a:bodyPr rtlCol="0" anchor="ctr"/>
+          <a:lstStyle/>
+          <a:p>
+            <a:pPr algn="ctr"/>
+            <a:r>
+              <a:rPr lang="en-GB" dirty="0"/>
+              <a:t>Micro/Agent-level</a:t>
+            </a:r>
+          </a:p>
+        </p:txBody>
+      </p:sp>
+      <p:sp>
+        <p:nvSpPr>
+          <p:cNvPr id="23" name="TextBox 22">
+            <a:extLst>
+              <a:ext uri="{FF2B5EF4-FFF2-40B4-BE49-F238E27FC236}">
+                <a16:creationId xmlns:a16="http://schemas.microsoft.com/office/drawing/2014/main" id="{D222C357-41BC-47D2-BCD7-5AFECE33E21B}"/>
+              </a:ext>
+            </a:extLst>
+          </p:cNvPr>
+          <p:cNvSpPr txBox="1"/>
+          <p:nvPr/>
+        </p:nvSpPr>
+        <p:spPr>
+          <a:xfrm>
+            <a:off x="10548595" y="4146219"/>
+            <a:ext cx="1847654" cy="923330"/>
+          </a:xfrm>
+          <a:prstGeom prst="rect">
+            <a:avLst/>
+          </a:prstGeom>
+          <a:noFill/>
+        </p:spPr>
+        <p:txBody>
+          <a:bodyPr wrap="square" rtlCol="0">
+            <a:spAutoFit/>
+          </a:bodyPr>
+          <a:lstStyle/>
+          <a:p>
+            <a:r>
+              <a:rPr lang="en-GB" dirty="0"/>
+              <a:t>Agent </a:t>
+            </a:r>
+            <a:r>
+              <a:rPr lang="en-GB" dirty="0" err="1"/>
+              <a:t>i</a:t>
+            </a:r>
+            <a:endParaRPr lang="en-GB" dirty="0"/>
+          </a:p>
+          <a:p>
+            <a:r>
+              <a:rPr lang="en-GB" dirty="0" err="1"/>
+              <a:t>i</a:t>
+            </a:r>
+            <a:r>
+              <a:rPr lang="en-GB" dirty="0"/>
+              <a:t> element </a:t>
+            </a:r>
+          </a:p>
+          <a:p>
+            <a:r>
+              <a:rPr lang="en-GB" dirty="0"/>
+              <a:t>{1,…,n}</a:t>
+            </a:r>
+          </a:p>
+        </p:txBody>
+      </p:sp>
+      <p:sp>
+        <p:nvSpPr>
+          <p:cNvPr id="27" name="Right Brace 26">
+            <a:extLst>
+              <a:ext uri="{FF2B5EF4-FFF2-40B4-BE49-F238E27FC236}">
+                <a16:creationId xmlns:a16="http://schemas.microsoft.com/office/drawing/2014/main" id="{A886134B-2B61-4673-BF79-8034BAAFA9BD}"/>
+              </a:ext>
+            </a:extLst>
+          </p:cNvPr>
+          <p:cNvSpPr/>
+          <p:nvPr/>
+        </p:nvSpPr>
+        <p:spPr>
+          <a:xfrm rot="5400000">
+            <a:off x="5162759" y="1176774"/>
+            <a:ext cx="496454" cy="8502979"/>
+          </a:xfrm>
+          <a:prstGeom prst="rightBrace">
+            <a:avLst>
+              <a:gd name="adj1" fmla="val 8333"/>
+              <a:gd name="adj2" fmla="val 50950"/>
+            </a:avLst>
+          </a:prstGeom>
+          <a:ln w="57150"/>
+        </p:spPr>
+        <p:style>
+          <a:lnRef idx="1">
+            <a:schemeClr val="accent1"/>
+          </a:lnRef>
+          <a:fillRef idx="0">
+            <a:schemeClr val="accent1"/>
+          </a:fillRef>
+          <a:effectRef idx="0">
+            <a:schemeClr val="accent1"/>
+          </a:effectRef>
+          <a:fontRef idx="minor">
+            <a:schemeClr val="tx1"/>
+          </a:fontRef>
+        </p:style>
+        <p:txBody>
+          <a:bodyPr rtlCol="0" anchor="ctr"/>
+          <a:lstStyle/>
+          <a:p>
+            <a:pPr algn="ctr"/>
+            <a:endParaRPr lang="en-GB" dirty="0"/>
+          </a:p>
+        </p:txBody>
+      </p:sp>
+      <p:sp>
+        <p:nvSpPr>
+          <p:cNvPr id="28" name="TextBox 27">
+            <a:extLst>
+              <a:ext uri="{FF2B5EF4-FFF2-40B4-BE49-F238E27FC236}">
+                <a16:creationId xmlns:a16="http://schemas.microsoft.com/office/drawing/2014/main" id="{87652B55-F852-4DD5-A3AF-E374C7352BE4}"/>
+              </a:ext>
+            </a:extLst>
+          </p:cNvPr>
+          <p:cNvSpPr txBox="1"/>
+          <p:nvPr/>
+        </p:nvSpPr>
+        <p:spPr>
+          <a:xfrm>
+            <a:off x="3835137" y="6118717"/>
+            <a:ext cx="5194169" cy="369332"/>
+          </a:xfrm>
+          <a:prstGeom prst="rect">
+            <a:avLst/>
+          </a:prstGeom>
+          <a:noFill/>
+        </p:spPr>
+        <p:txBody>
+          <a:bodyPr wrap="square" rtlCol="0">
+            <a:spAutoFit/>
+          </a:bodyPr>
+          <a:lstStyle/>
+          <a:p>
+            <a:r>
+              <a:rPr lang="en-GB" dirty="0"/>
+              <a:t>One data </a:t>
+            </a:r>
+            <a:r>
+              <a:rPr lang="en-GB" dirty="0" err="1"/>
+              <a:t>assimiliation</a:t>
+            </a:r>
+            <a:r>
+              <a:rPr lang="en-GB" dirty="0"/>
+              <a:t> time step</a:t>
+            </a:r>
+          </a:p>
+        </p:txBody>
+      </p:sp>
+      <p:sp>
+        <p:nvSpPr>
+          <p:cNvPr id="29" name="TextBox 28">
+            <a:extLst>
+              <a:ext uri="{FF2B5EF4-FFF2-40B4-BE49-F238E27FC236}">
+                <a16:creationId xmlns:a16="http://schemas.microsoft.com/office/drawing/2014/main" id="{3E6127CA-D038-4157-A6D7-3FA4A23CCB5E}"/>
+              </a:ext>
+            </a:extLst>
+          </p:cNvPr>
+          <p:cNvSpPr txBox="1"/>
+          <p:nvPr/>
+        </p:nvSpPr>
+        <p:spPr>
+          <a:xfrm>
+            <a:off x="8268877" y="3277271"/>
+            <a:ext cx="1847654" cy="646331"/>
+          </a:xfrm>
+          <a:prstGeom prst="rect">
+            <a:avLst/>
+          </a:prstGeom>
+          <a:noFill/>
+        </p:spPr>
+        <p:txBody>
+          <a:bodyPr wrap="square" rtlCol="0">
+            <a:spAutoFit/>
+          </a:bodyPr>
+          <a:lstStyle/>
+          <a:p>
+            <a:r>
+              <a:rPr lang="en-GB" sz="3600" dirty="0"/>
+              <a:t>?</a:t>
+            </a:r>
           </a:p>
         </p:txBody>
       </p:sp>
     </p:spTree>
     <p:extLst>
       <p:ext uri="{BB962C8B-B14F-4D97-AF65-F5344CB8AC3E}">
-        <p14:creationId xmlns:p14="http://schemas.microsoft.com/office/powerpoint/2010/main" val="71200935"/>
-      </p:ext>
-    </p:extLst>
-  </p:cSld>
-  <p:clrMapOvr>
-    <a:masterClrMapping/>
-  </p:clrMapOvr>
-</p:sld>
-</file>
-
-<file path=ppt/slides/slide2.xml><?xml version="1.0" encoding="utf-8"?>
-<p:sld xmlns:a="http://schemas.openxmlformats.org/drawingml/2006/main" xmlns:r="http://schemas.openxmlformats.org/officeDocument/2006/relationships" xmlns:p="http://schemas.openxmlformats.org/presentationml/2006/main">
-  <p:cSld>
-    <p:spTree>
-      <p:nvGrpSpPr>
-        <p:cNvPr id="1" name=""/>
-        <p:cNvGrpSpPr/>
-        <p:nvPr/>
-      </p:nvGrpSpPr>
-      <p:grpSpPr>
-        <a:xfrm>
-          <a:off x="0" y="0"/>
-          <a:ext cx="0" cy="0"/>
-          <a:chOff x="0" y="0"/>
-          <a:chExt cx="0" cy="0"/>
-        </a:xfrm>
-      </p:grpSpPr>
-    </p:spTree>
-    <p:extLst>
-      <p:ext uri="{BB962C8B-B14F-4D97-AF65-F5344CB8AC3E}">
-        <p14:creationId xmlns:p14="http://schemas.microsoft.com/office/powerpoint/2010/main" val="2209262235"/>
+        <p14:creationId xmlns:p14="http://schemas.microsoft.com/office/powerpoint/2010/main" val="3554008912"/>
       </p:ext>
     </p:extLst>
   </p:cSld>

</xml_diff>